<commit_message>
explanations of terminologies about product data
</commit_message>
<xml_diff>
--- a/img/img.pptx
+++ b/img/img.pptx
@@ -7,6 +7,7 @@
   <p:sldIdLst>
     <p:sldId id="256" r:id="rId2"/>
     <p:sldId id="257" r:id="rId3"/>
+    <p:sldId id="258" r:id="rId4"/>
   </p:sldIdLst>
   <p:sldSz cx="24384000" cy="13716000"/>
   <p:notesSz cx="6858000" cy="9144000"/>
@@ -105,6 +106,11 @@
       </a:defRPr>
     </a:lvl9pPr>
   </p:defaultTextStyle>
+  <p:extLst>
+    <p:ext uri="{EFAFB233-063F-42B5-8137-9DF3F51BA10A}">
+      <p15:sldGuideLst xmlns:p15="http://schemas.microsoft.com/office/powerpoint/2012/main"/>
+    </p:ext>
+  </p:extLst>
 </p:presentation>
 </file>
 
@@ -239,7 +245,7 @@
           <a:p>
             <a:fld id="{49441F61-D47F-40FA-857E-B03A0BC50A00}" type="datetimeFigureOut">
               <a:rPr lang="zh-TW" altLang="en-US" smtClean="0"/>
-              <a:t>2023/5/31</a:t>
+              <a:t>2023/6/2</a:t>
             </a:fld>
             <a:endParaRPr lang="zh-TW" altLang="en-US"/>
           </a:p>
@@ -409,7 +415,7 @@
           <a:p>
             <a:fld id="{49441F61-D47F-40FA-857E-B03A0BC50A00}" type="datetimeFigureOut">
               <a:rPr lang="zh-TW" altLang="en-US" smtClean="0"/>
-              <a:t>2023/5/31</a:t>
+              <a:t>2023/6/2</a:t>
             </a:fld>
             <a:endParaRPr lang="zh-TW" altLang="en-US"/>
           </a:p>
@@ -589,7 +595,7 @@
           <a:p>
             <a:fld id="{49441F61-D47F-40FA-857E-B03A0BC50A00}" type="datetimeFigureOut">
               <a:rPr lang="zh-TW" altLang="en-US" smtClean="0"/>
-              <a:t>2023/5/31</a:t>
+              <a:t>2023/6/2</a:t>
             </a:fld>
             <a:endParaRPr lang="zh-TW" altLang="en-US"/>
           </a:p>
@@ -759,7 +765,7 @@
           <a:p>
             <a:fld id="{49441F61-D47F-40FA-857E-B03A0BC50A00}" type="datetimeFigureOut">
               <a:rPr lang="zh-TW" altLang="en-US" smtClean="0"/>
-              <a:t>2023/5/31</a:t>
+              <a:t>2023/6/2</a:t>
             </a:fld>
             <a:endParaRPr lang="zh-TW" altLang="en-US"/>
           </a:p>
@@ -1005,7 +1011,7 @@
           <a:p>
             <a:fld id="{49441F61-D47F-40FA-857E-B03A0BC50A00}" type="datetimeFigureOut">
               <a:rPr lang="zh-TW" altLang="en-US" smtClean="0"/>
-              <a:t>2023/5/31</a:t>
+              <a:t>2023/6/2</a:t>
             </a:fld>
             <a:endParaRPr lang="zh-TW" altLang="en-US"/>
           </a:p>
@@ -1237,7 +1243,7 @@
           <a:p>
             <a:fld id="{49441F61-D47F-40FA-857E-B03A0BC50A00}" type="datetimeFigureOut">
               <a:rPr lang="zh-TW" altLang="en-US" smtClean="0"/>
-              <a:t>2023/5/31</a:t>
+              <a:t>2023/6/2</a:t>
             </a:fld>
             <a:endParaRPr lang="zh-TW" altLang="en-US"/>
           </a:p>
@@ -1604,7 +1610,7 @@
           <a:p>
             <a:fld id="{49441F61-D47F-40FA-857E-B03A0BC50A00}" type="datetimeFigureOut">
               <a:rPr lang="zh-TW" altLang="en-US" smtClean="0"/>
-              <a:t>2023/5/31</a:t>
+              <a:t>2023/6/2</a:t>
             </a:fld>
             <a:endParaRPr lang="zh-TW" altLang="en-US"/>
           </a:p>
@@ -1722,7 +1728,7 @@
           <a:p>
             <a:fld id="{49441F61-D47F-40FA-857E-B03A0BC50A00}" type="datetimeFigureOut">
               <a:rPr lang="zh-TW" altLang="en-US" smtClean="0"/>
-              <a:t>2023/5/31</a:t>
+              <a:t>2023/6/2</a:t>
             </a:fld>
             <a:endParaRPr lang="zh-TW" altLang="en-US"/>
           </a:p>
@@ -1817,7 +1823,7 @@
           <a:p>
             <a:fld id="{49441F61-D47F-40FA-857E-B03A0BC50A00}" type="datetimeFigureOut">
               <a:rPr lang="zh-TW" altLang="en-US" smtClean="0"/>
-              <a:t>2023/5/31</a:t>
+              <a:t>2023/6/2</a:t>
             </a:fld>
             <a:endParaRPr lang="zh-TW" altLang="en-US"/>
           </a:p>
@@ -2094,7 +2100,7 @@
           <a:p>
             <a:fld id="{49441F61-D47F-40FA-857E-B03A0BC50A00}" type="datetimeFigureOut">
               <a:rPr lang="zh-TW" altLang="en-US" smtClean="0"/>
-              <a:t>2023/5/31</a:t>
+              <a:t>2023/6/2</a:t>
             </a:fld>
             <a:endParaRPr lang="zh-TW" altLang="en-US"/>
           </a:p>
@@ -2351,7 +2357,7 @@
           <a:p>
             <a:fld id="{49441F61-D47F-40FA-857E-B03A0BC50A00}" type="datetimeFigureOut">
               <a:rPr lang="zh-TW" altLang="en-US" smtClean="0"/>
-              <a:t>2023/5/31</a:t>
+              <a:t>2023/6/2</a:t>
             </a:fld>
             <a:endParaRPr lang="zh-TW" altLang="en-US"/>
           </a:p>
@@ -2564,7 +2570,7 @@
           <a:p>
             <a:fld id="{49441F61-D47F-40FA-857E-B03A0BC50A00}" type="datetimeFigureOut">
               <a:rPr lang="zh-TW" altLang="en-US" smtClean="0"/>
-              <a:t>2023/5/31</a:t>
+              <a:t>2023/6/2</a:t>
             </a:fld>
             <a:endParaRPr lang="zh-TW" altLang="en-US"/>
           </a:p>
@@ -14411,6 +14417,177 @@
 </p:sld>
 </file>
 
+<file path=ppt/slides/slide3.xml><?xml version="1.0" encoding="utf-8"?>
+<p:sld xmlns:a="http://schemas.openxmlformats.org/drawingml/2006/main" xmlns:r="http://schemas.openxmlformats.org/officeDocument/2006/relationships" xmlns:p="http://schemas.openxmlformats.org/presentationml/2006/main">
+  <p:cSld>
+    <p:spTree>
+      <p:nvGrpSpPr>
+        <p:cNvPr id="1" name=""/>
+        <p:cNvGrpSpPr/>
+        <p:nvPr/>
+      </p:nvGrpSpPr>
+      <p:grpSpPr>
+        <a:xfrm>
+          <a:off x="0" y="0"/>
+          <a:ext cx="0" cy="0"/>
+          <a:chOff x="0" y="0"/>
+          <a:chExt cx="0" cy="0"/>
+        </a:xfrm>
+      </p:grpSpPr>
+      <p:pic>
+        <p:nvPicPr>
+          <p:cNvPr id="5" name="圖片 4">
+            <a:extLst>
+              <a:ext uri="{FF2B5EF4-FFF2-40B4-BE49-F238E27FC236}">
+                <a16:creationId xmlns:a16="http://schemas.microsoft.com/office/drawing/2014/main" id="{123DC43A-3AF3-C2B3-B1D0-90E727BC91E1}"/>
+              </a:ext>
+            </a:extLst>
+          </p:cNvPr>
+          <p:cNvPicPr>
+            <a:picLocks noChangeAspect="1"/>
+          </p:cNvPicPr>
+          <p:nvPr/>
+        </p:nvPicPr>
+        <p:blipFill>
+          <a:blip r:embed="rId2"/>
+          <a:stretch>
+            <a:fillRect/>
+          </a:stretch>
+        </p:blipFill>
+        <p:spPr>
+          <a:xfrm>
+            <a:off x="3046723" y="1713782"/>
+            <a:ext cx="18290553" cy="10288436"/>
+          </a:xfrm>
+          <a:prstGeom prst="rect">
+            <a:avLst/>
+          </a:prstGeom>
+          <a:ln>
+            <a:solidFill>
+              <a:schemeClr val="tx1"/>
+            </a:solidFill>
+          </a:ln>
+        </p:spPr>
+      </p:pic>
+      <p:sp>
+        <p:nvSpPr>
+          <p:cNvPr id="6" name="矩形 5">
+            <a:extLst>
+              <a:ext uri="{FF2B5EF4-FFF2-40B4-BE49-F238E27FC236}">
+                <a16:creationId xmlns:a16="http://schemas.microsoft.com/office/drawing/2014/main" id="{085D1F49-0180-2F80-7CF5-BCAA8FB00E1C}"/>
+              </a:ext>
+            </a:extLst>
+          </p:cNvPr>
+          <p:cNvSpPr/>
+          <p:nvPr/>
+        </p:nvSpPr>
+        <p:spPr>
+          <a:xfrm>
+            <a:off x="13134975" y="2819400"/>
+            <a:ext cx="8134349" cy="5082396"/>
+          </a:xfrm>
+          <a:prstGeom prst="rect">
+            <a:avLst/>
+          </a:prstGeom>
+          <a:noFill/>
+          <a:ln w="57150">
+            <a:solidFill>
+              <a:srgbClr val="FF0000"/>
+            </a:solidFill>
+          </a:ln>
+        </p:spPr>
+        <p:style>
+          <a:lnRef idx="2">
+            <a:schemeClr val="accent1">
+              <a:shade val="50000"/>
+            </a:schemeClr>
+          </a:lnRef>
+          <a:fillRef idx="1">
+            <a:schemeClr val="accent1"/>
+          </a:fillRef>
+          <a:effectRef idx="0">
+            <a:schemeClr val="accent1"/>
+          </a:effectRef>
+          <a:fontRef idx="minor">
+            <a:schemeClr val="lt1"/>
+          </a:fontRef>
+        </p:style>
+        <p:txBody>
+          <a:bodyPr rtlCol="0" anchor="ctr"/>
+          <a:lstStyle/>
+          <a:p>
+            <a:pPr algn="ctr"/>
+            <a:endParaRPr lang="zh-TW" altLang="en-US"/>
+          </a:p>
+        </p:txBody>
+      </p:sp>
+      <p:sp>
+        <p:nvSpPr>
+          <p:cNvPr id="7" name="矩形 6">
+            <a:extLst>
+              <a:ext uri="{FF2B5EF4-FFF2-40B4-BE49-F238E27FC236}">
+                <a16:creationId xmlns:a16="http://schemas.microsoft.com/office/drawing/2014/main" id="{4DE4F781-E599-2210-0058-16886EC04061}"/>
+              </a:ext>
+            </a:extLst>
+          </p:cNvPr>
+          <p:cNvSpPr/>
+          <p:nvPr/>
+        </p:nvSpPr>
+        <p:spPr>
+          <a:xfrm>
+            <a:off x="16569108" y="2907504"/>
+            <a:ext cx="1463728" cy="252413"/>
+          </a:xfrm>
+          <a:prstGeom prst="rect">
+            <a:avLst/>
+          </a:prstGeom>
+          <a:solidFill>
+            <a:srgbClr val="FFFF00">
+              <a:alpha val="25000"/>
+            </a:srgbClr>
+          </a:solidFill>
+          <a:ln w="57150">
+            <a:noFill/>
+          </a:ln>
+        </p:spPr>
+        <p:style>
+          <a:lnRef idx="2">
+            <a:schemeClr val="accent1">
+              <a:shade val="50000"/>
+            </a:schemeClr>
+          </a:lnRef>
+          <a:fillRef idx="1">
+            <a:schemeClr val="accent1"/>
+          </a:fillRef>
+          <a:effectRef idx="0">
+            <a:schemeClr val="accent1"/>
+          </a:effectRef>
+          <a:fontRef idx="minor">
+            <a:schemeClr val="lt1"/>
+          </a:fontRef>
+        </p:style>
+        <p:txBody>
+          <a:bodyPr rtlCol="0" anchor="ctr"/>
+          <a:lstStyle/>
+          <a:p>
+            <a:pPr algn="ctr"/>
+            <a:endParaRPr lang="zh-TW" altLang="en-US"/>
+          </a:p>
+        </p:txBody>
+      </p:sp>
+    </p:spTree>
+    <p:extLst>
+      <p:ext uri="{BB962C8B-B14F-4D97-AF65-F5344CB8AC3E}">
+        <p14:creationId xmlns:p14="http://schemas.microsoft.com/office/powerpoint/2010/main" val="2652134181"/>
+      </p:ext>
+    </p:extLst>
+  </p:cSld>
+  <p:clrMapOvr>
+    <a:masterClrMapping/>
+  </p:clrMapOvr>
+</p:sld>
+</file>
+
 <file path=ppt/theme/theme1.xml><?xml version="1.0" encoding="utf-8"?>
 <a:theme xmlns:a="http://schemas.openxmlformats.org/drawingml/2006/main" name="Office 佈景主題">
   <a:themeElements>

</xml_diff>

<commit_message>
described the steps to import from CAD to CAE
</commit_message>
<xml_diff>
--- a/img/img.pptx
+++ b/img/img.pptx
@@ -8,6 +8,9 @@
     <p:sldId id="256" r:id="rId2"/>
     <p:sldId id="257" r:id="rId3"/>
     <p:sldId id="258" r:id="rId4"/>
+    <p:sldId id="259" r:id="rId5"/>
+    <p:sldId id="260" r:id="rId6"/>
+    <p:sldId id="261" r:id="rId7"/>
   </p:sldIdLst>
   <p:sldSz cx="24384000" cy="13716000"/>
   <p:notesSz cx="6858000" cy="9144000"/>
@@ -245,7 +248,7 @@
           <a:p>
             <a:fld id="{49441F61-D47F-40FA-857E-B03A0BC50A00}" type="datetimeFigureOut">
               <a:rPr lang="zh-TW" altLang="en-US" smtClean="0"/>
-              <a:t>2023/6/2</a:t>
+              <a:t>2023/6/28</a:t>
             </a:fld>
             <a:endParaRPr lang="zh-TW" altLang="en-US"/>
           </a:p>
@@ -415,7 +418,7 @@
           <a:p>
             <a:fld id="{49441F61-D47F-40FA-857E-B03A0BC50A00}" type="datetimeFigureOut">
               <a:rPr lang="zh-TW" altLang="en-US" smtClean="0"/>
-              <a:t>2023/6/2</a:t>
+              <a:t>2023/6/28</a:t>
             </a:fld>
             <a:endParaRPr lang="zh-TW" altLang="en-US"/>
           </a:p>
@@ -595,7 +598,7 @@
           <a:p>
             <a:fld id="{49441F61-D47F-40FA-857E-B03A0BC50A00}" type="datetimeFigureOut">
               <a:rPr lang="zh-TW" altLang="en-US" smtClean="0"/>
-              <a:t>2023/6/2</a:t>
+              <a:t>2023/6/28</a:t>
             </a:fld>
             <a:endParaRPr lang="zh-TW" altLang="en-US"/>
           </a:p>
@@ -765,7 +768,7 @@
           <a:p>
             <a:fld id="{49441F61-D47F-40FA-857E-B03A0BC50A00}" type="datetimeFigureOut">
               <a:rPr lang="zh-TW" altLang="en-US" smtClean="0"/>
-              <a:t>2023/6/2</a:t>
+              <a:t>2023/6/28</a:t>
             </a:fld>
             <a:endParaRPr lang="zh-TW" altLang="en-US"/>
           </a:p>
@@ -1011,7 +1014,7 @@
           <a:p>
             <a:fld id="{49441F61-D47F-40FA-857E-B03A0BC50A00}" type="datetimeFigureOut">
               <a:rPr lang="zh-TW" altLang="en-US" smtClean="0"/>
-              <a:t>2023/6/2</a:t>
+              <a:t>2023/6/28</a:t>
             </a:fld>
             <a:endParaRPr lang="zh-TW" altLang="en-US"/>
           </a:p>
@@ -1243,7 +1246,7 @@
           <a:p>
             <a:fld id="{49441F61-D47F-40FA-857E-B03A0BC50A00}" type="datetimeFigureOut">
               <a:rPr lang="zh-TW" altLang="en-US" smtClean="0"/>
-              <a:t>2023/6/2</a:t>
+              <a:t>2023/6/28</a:t>
             </a:fld>
             <a:endParaRPr lang="zh-TW" altLang="en-US"/>
           </a:p>
@@ -1610,7 +1613,7 @@
           <a:p>
             <a:fld id="{49441F61-D47F-40FA-857E-B03A0BC50A00}" type="datetimeFigureOut">
               <a:rPr lang="zh-TW" altLang="en-US" smtClean="0"/>
-              <a:t>2023/6/2</a:t>
+              <a:t>2023/6/28</a:t>
             </a:fld>
             <a:endParaRPr lang="zh-TW" altLang="en-US"/>
           </a:p>
@@ -1728,7 +1731,7 @@
           <a:p>
             <a:fld id="{49441F61-D47F-40FA-857E-B03A0BC50A00}" type="datetimeFigureOut">
               <a:rPr lang="zh-TW" altLang="en-US" smtClean="0"/>
-              <a:t>2023/6/2</a:t>
+              <a:t>2023/6/28</a:t>
             </a:fld>
             <a:endParaRPr lang="zh-TW" altLang="en-US"/>
           </a:p>
@@ -1823,7 +1826,7 @@
           <a:p>
             <a:fld id="{49441F61-D47F-40FA-857E-B03A0BC50A00}" type="datetimeFigureOut">
               <a:rPr lang="zh-TW" altLang="en-US" smtClean="0"/>
-              <a:t>2023/6/2</a:t>
+              <a:t>2023/6/28</a:t>
             </a:fld>
             <a:endParaRPr lang="zh-TW" altLang="en-US"/>
           </a:p>
@@ -2100,7 +2103,7 @@
           <a:p>
             <a:fld id="{49441F61-D47F-40FA-857E-B03A0BC50A00}" type="datetimeFigureOut">
               <a:rPr lang="zh-TW" altLang="en-US" smtClean="0"/>
-              <a:t>2023/6/2</a:t>
+              <a:t>2023/6/28</a:t>
             </a:fld>
             <a:endParaRPr lang="zh-TW" altLang="en-US"/>
           </a:p>
@@ -2357,7 +2360,7 @@
           <a:p>
             <a:fld id="{49441F61-D47F-40FA-857E-B03A0BC50A00}" type="datetimeFigureOut">
               <a:rPr lang="zh-TW" altLang="en-US" smtClean="0"/>
-              <a:t>2023/6/2</a:t>
+              <a:t>2023/6/28</a:t>
             </a:fld>
             <a:endParaRPr lang="zh-TW" altLang="en-US"/>
           </a:p>
@@ -2570,7 +2573,7 @@
           <a:p>
             <a:fld id="{49441F61-D47F-40FA-857E-B03A0BC50A00}" type="datetimeFigureOut">
               <a:rPr lang="zh-TW" altLang="en-US" smtClean="0"/>
-              <a:t>2023/6/2</a:t>
+              <a:t>2023/6/28</a:t>
             </a:fld>
             <a:endParaRPr lang="zh-TW" altLang="en-US"/>
           </a:p>
@@ -14588,6 +14591,1225 @@
 </p:sld>
 </file>
 
+<file path=ppt/slides/slide4.xml><?xml version="1.0" encoding="utf-8"?>
+<p:sld xmlns:a="http://schemas.openxmlformats.org/drawingml/2006/main" xmlns:r="http://schemas.openxmlformats.org/officeDocument/2006/relationships" xmlns:p="http://schemas.openxmlformats.org/presentationml/2006/main">
+  <p:cSld>
+    <p:spTree>
+      <p:nvGrpSpPr>
+        <p:cNvPr id="1" name=""/>
+        <p:cNvGrpSpPr/>
+        <p:nvPr/>
+      </p:nvGrpSpPr>
+      <p:grpSpPr>
+        <a:xfrm>
+          <a:off x="0" y="0"/>
+          <a:ext cx="0" cy="0"/>
+          <a:chOff x="0" y="0"/>
+          <a:chExt cx="0" cy="0"/>
+        </a:xfrm>
+      </p:grpSpPr>
+      <p:pic>
+        <p:nvPicPr>
+          <p:cNvPr id="3" name="圖片 2">
+            <a:extLst>
+              <a:ext uri="{FF2B5EF4-FFF2-40B4-BE49-F238E27FC236}">
+                <a16:creationId xmlns:a16="http://schemas.microsoft.com/office/drawing/2014/main" id="{67EF661B-536B-6E7C-887E-51F86EF3ED77}"/>
+              </a:ext>
+            </a:extLst>
+          </p:cNvPr>
+          <p:cNvPicPr>
+            <a:picLocks noChangeAspect="1"/>
+          </p:cNvPicPr>
+          <p:nvPr/>
+        </p:nvPicPr>
+        <p:blipFill>
+          <a:blip r:embed="rId2"/>
+          <a:stretch>
+            <a:fillRect/>
+          </a:stretch>
+        </p:blipFill>
+        <p:spPr>
+          <a:xfrm>
+            <a:off x="4883786" y="3462996"/>
+            <a:ext cx="14616427" cy="6790008"/>
+          </a:xfrm>
+          <a:prstGeom prst="rect">
+            <a:avLst/>
+          </a:prstGeom>
+          <a:ln>
+            <a:solidFill>
+              <a:schemeClr val="tx1"/>
+            </a:solidFill>
+          </a:ln>
+        </p:spPr>
+      </p:pic>
+      <p:sp>
+        <p:nvSpPr>
+          <p:cNvPr id="4" name="矩形 3">
+            <a:extLst>
+              <a:ext uri="{FF2B5EF4-FFF2-40B4-BE49-F238E27FC236}">
+                <a16:creationId xmlns:a16="http://schemas.microsoft.com/office/drawing/2014/main" id="{555189ED-4827-91F3-A94A-677510879D90}"/>
+              </a:ext>
+            </a:extLst>
+          </p:cNvPr>
+          <p:cNvSpPr/>
+          <p:nvPr/>
+        </p:nvSpPr>
+        <p:spPr>
+          <a:xfrm>
+            <a:off x="5610953" y="9107284"/>
+            <a:ext cx="2417583" cy="257306"/>
+          </a:xfrm>
+          <a:prstGeom prst="rect">
+            <a:avLst/>
+          </a:prstGeom>
+          <a:noFill/>
+          <a:ln w="57150">
+            <a:solidFill>
+              <a:srgbClr val="FF0000"/>
+            </a:solidFill>
+          </a:ln>
+        </p:spPr>
+        <p:style>
+          <a:lnRef idx="2">
+            <a:schemeClr val="accent1">
+              <a:shade val="50000"/>
+            </a:schemeClr>
+          </a:lnRef>
+          <a:fillRef idx="1">
+            <a:schemeClr val="accent1"/>
+          </a:fillRef>
+          <a:effectRef idx="0">
+            <a:schemeClr val="accent1"/>
+          </a:effectRef>
+          <a:fontRef idx="minor">
+            <a:schemeClr val="lt1"/>
+          </a:fontRef>
+        </p:style>
+        <p:txBody>
+          <a:bodyPr rtlCol="0" anchor="ctr"/>
+          <a:lstStyle/>
+          <a:p>
+            <a:pPr algn="ctr"/>
+            <a:endParaRPr lang="zh-TW" altLang="en-US"/>
+          </a:p>
+        </p:txBody>
+      </p:sp>
+      <p:pic>
+        <p:nvPicPr>
+          <p:cNvPr id="9" name="圖片 8">
+            <a:extLst>
+              <a:ext uri="{FF2B5EF4-FFF2-40B4-BE49-F238E27FC236}">
+                <a16:creationId xmlns:a16="http://schemas.microsoft.com/office/drawing/2014/main" id="{5E1D0656-D1B9-F4A8-7A19-A9A59D8BFB7B}"/>
+              </a:ext>
+            </a:extLst>
+          </p:cNvPr>
+          <p:cNvPicPr>
+            <a:picLocks noChangeAspect="1"/>
+          </p:cNvPicPr>
+          <p:nvPr/>
+        </p:nvPicPr>
+        <p:blipFill rotWithShape="1">
+          <a:blip r:embed="rId3"/>
+          <a:srcRect l="237" t="369"/>
+          <a:stretch/>
+        </p:blipFill>
+        <p:spPr>
+          <a:xfrm>
+            <a:off x="9344024" y="4781550"/>
+            <a:ext cx="5709533" cy="4168321"/>
+          </a:xfrm>
+          <a:prstGeom prst="rect">
+            <a:avLst/>
+          </a:prstGeom>
+          <a:ln>
+            <a:solidFill>
+              <a:schemeClr val="tx1"/>
+            </a:solidFill>
+          </a:ln>
+        </p:spPr>
+      </p:pic>
+      <p:sp>
+        <p:nvSpPr>
+          <p:cNvPr id="10" name="矩形 9">
+            <a:extLst>
+              <a:ext uri="{FF2B5EF4-FFF2-40B4-BE49-F238E27FC236}">
+                <a16:creationId xmlns:a16="http://schemas.microsoft.com/office/drawing/2014/main" id="{43C1273E-739E-69BB-D661-51B02B6FC95D}"/>
+              </a:ext>
+            </a:extLst>
+          </p:cNvPr>
+          <p:cNvSpPr/>
+          <p:nvPr/>
+        </p:nvSpPr>
+        <p:spPr>
+          <a:xfrm>
+            <a:off x="9409388" y="6221125"/>
+            <a:ext cx="5570596" cy="376779"/>
+          </a:xfrm>
+          <a:prstGeom prst="rect">
+            <a:avLst/>
+          </a:prstGeom>
+          <a:noFill/>
+          <a:ln w="57150">
+            <a:solidFill>
+              <a:srgbClr val="FF0000"/>
+            </a:solidFill>
+          </a:ln>
+        </p:spPr>
+        <p:style>
+          <a:lnRef idx="2">
+            <a:schemeClr val="accent1">
+              <a:shade val="50000"/>
+            </a:schemeClr>
+          </a:lnRef>
+          <a:fillRef idx="1">
+            <a:schemeClr val="accent1"/>
+          </a:fillRef>
+          <a:effectRef idx="0">
+            <a:schemeClr val="accent1"/>
+          </a:effectRef>
+          <a:fontRef idx="minor">
+            <a:schemeClr val="lt1"/>
+          </a:fontRef>
+        </p:style>
+        <p:txBody>
+          <a:bodyPr rtlCol="0" anchor="ctr"/>
+          <a:lstStyle/>
+          <a:p>
+            <a:pPr algn="ctr"/>
+            <a:endParaRPr lang="zh-TW" altLang="en-US"/>
+          </a:p>
+        </p:txBody>
+      </p:sp>
+      <p:sp>
+        <p:nvSpPr>
+          <p:cNvPr id="11" name="矩形 10">
+            <a:extLst>
+              <a:ext uri="{FF2B5EF4-FFF2-40B4-BE49-F238E27FC236}">
+                <a16:creationId xmlns:a16="http://schemas.microsoft.com/office/drawing/2014/main" id="{854C7D5A-2D11-98B7-1D12-FB7D2D5B91E2}"/>
+              </a:ext>
+            </a:extLst>
+          </p:cNvPr>
+          <p:cNvSpPr/>
+          <p:nvPr/>
+        </p:nvSpPr>
+        <p:spPr>
+          <a:xfrm>
+            <a:off x="13544362" y="8501760"/>
+            <a:ext cx="724277" cy="403959"/>
+          </a:xfrm>
+          <a:prstGeom prst="rect">
+            <a:avLst/>
+          </a:prstGeom>
+          <a:noFill/>
+          <a:ln w="57150">
+            <a:solidFill>
+              <a:srgbClr val="FF0000"/>
+            </a:solidFill>
+          </a:ln>
+        </p:spPr>
+        <p:style>
+          <a:lnRef idx="2">
+            <a:schemeClr val="accent1">
+              <a:shade val="50000"/>
+            </a:schemeClr>
+          </a:lnRef>
+          <a:fillRef idx="1">
+            <a:schemeClr val="accent1"/>
+          </a:fillRef>
+          <a:effectRef idx="0">
+            <a:schemeClr val="accent1"/>
+          </a:effectRef>
+          <a:fontRef idx="minor">
+            <a:schemeClr val="lt1"/>
+          </a:fontRef>
+        </p:style>
+        <p:txBody>
+          <a:bodyPr rtlCol="0" anchor="ctr"/>
+          <a:lstStyle/>
+          <a:p>
+            <a:pPr algn="ctr"/>
+            <a:endParaRPr lang="zh-TW" altLang="en-US"/>
+          </a:p>
+        </p:txBody>
+      </p:sp>
+      <p:sp>
+        <p:nvSpPr>
+          <p:cNvPr id="12" name="橢圓 11">
+            <a:extLst>
+              <a:ext uri="{FF2B5EF4-FFF2-40B4-BE49-F238E27FC236}">
+                <a16:creationId xmlns:a16="http://schemas.microsoft.com/office/drawing/2014/main" id="{0B346C6C-A481-8F83-87FC-12660076CE53}"/>
+              </a:ext>
+            </a:extLst>
+          </p:cNvPr>
+          <p:cNvSpPr/>
+          <p:nvPr/>
+        </p:nvSpPr>
+        <p:spPr>
+          <a:xfrm>
+            <a:off x="7740536" y="9232797"/>
+            <a:ext cx="576000" cy="576000"/>
+          </a:xfrm>
+          <a:prstGeom prst="ellipse">
+            <a:avLst/>
+          </a:prstGeom>
+          <a:solidFill>
+            <a:srgbClr val="000000">
+              <a:alpha val="20000"/>
+            </a:srgbClr>
+          </a:solidFill>
+          <a:ln w="12700" cap="flat">
+            <a:noFill/>
+            <a:miter lim="400000"/>
+          </a:ln>
+          <a:effectLst/>
+        </p:spPr>
+        <p:txBody>
+          <a:bodyPr rot="0" spcFirstLastPara="1" vertOverflow="overflow" horzOverflow="overflow" vert="horz" wrap="square" lIns="71437" tIns="71437" rIns="71437" bIns="71437" numCol="1" spcCol="38100" rtlCol="0" anchor="ctr">
+            <a:spAutoFit/>
+          </a:bodyPr>
+          <a:lstStyle/>
+          <a:p>
+            <a:pPr marL="0" marR="0" lvl="0" indent="0" algn="ctr" defTabSz="821531" eaLnBrk="1" fontAlgn="auto" latinLnBrk="0" hangingPunct="0">
+              <a:lnSpc>
+                <a:spcPct val="100000"/>
+              </a:lnSpc>
+              <a:spcBef>
+                <a:spcPts val="0"/>
+              </a:spcBef>
+              <a:spcAft>
+                <a:spcPts val="0"/>
+              </a:spcAft>
+              <a:buClrTx/>
+              <a:buSzTx/>
+              <a:buFontTx/>
+              <a:buNone/>
+              <a:tabLst/>
+              <a:defRPr/>
+            </a:pPr>
+            <a:r>
+              <a:rPr kumimoji="0" lang="en-US" altLang="zh-TW" b="1" i="0" u="none" strike="noStrike" kern="0" cap="none" spc="0" normalizeH="0" baseline="0" noProof="0" dirty="0">
+                <a:ln>
+                  <a:noFill/>
+                </a:ln>
+                <a:solidFill>
+                  <a:srgbClr val="FF0000"/>
+                </a:solidFill>
+                <a:effectLst/>
+                <a:uLnTx/>
+                <a:uFillTx/>
+                <a:latin typeface="Helvetica Neue"/>
+                <a:sym typeface="Helvetica Light"/>
+              </a:rPr>
+              <a:t>1</a:t>
+            </a:r>
+            <a:endParaRPr kumimoji="0" lang="zh-TW" altLang="en-US" b="1" i="0" u="none" strike="noStrike" kern="0" cap="none" spc="0" normalizeH="0" baseline="0" noProof="0" dirty="0">
+              <a:ln>
+                <a:noFill/>
+              </a:ln>
+              <a:solidFill>
+                <a:srgbClr val="FF0000"/>
+              </a:solidFill>
+              <a:effectLst/>
+              <a:uLnTx/>
+              <a:uFillTx/>
+              <a:latin typeface="Helvetica Neue"/>
+              <a:sym typeface="Helvetica Light"/>
+            </a:endParaRPr>
+          </a:p>
+        </p:txBody>
+      </p:sp>
+      <p:sp>
+        <p:nvSpPr>
+          <p:cNvPr id="13" name="橢圓 12">
+            <a:extLst>
+              <a:ext uri="{FF2B5EF4-FFF2-40B4-BE49-F238E27FC236}">
+                <a16:creationId xmlns:a16="http://schemas.microsoft.com/office/drawing/2014/main" id="{200676FB-FB0C-6F8C-D585-2B1D9F43BAF7}"/>
+              </a:ext>
+            </a:extLst>
+          </p:cNvPr>
+          <p:cNvSpPr/>
+          <p:nvPr/>
+        </p:nvSpPr>
+        <p:spPr>
+          <a:xfrm>
+            <a:off x="14403984" y="6533906"/>
+            <a:ext cx="576000" cy="592383"/>
+          </a:xfrm>
+          <a:prstGeom prst="ellipse">
+            <a:avLst/>
+          </a:prstGeom>
+          <a:solidFill>
+            <a:srgbClr val="000000">
+              <a:alpha val="20000"/>
+            </a:srgbClr>
+          </a:solidFill>
+          <a:ln w="12700" cap="flat">
+            <a:noFill/>
+            <a:miter lim="400000"/>
+          </a:ln>
+          <a:effectLst/>
+        </p:spPr>
+        <p:txBody>
+          <a:bodyPr rot="0" spcFirstLastPara="1" vertOverflow="overflow" horzOverflow="overflow" vert="horz" wrap="square" lIns="71437" tIns="71437" rIns="71437" bIns="71437" numCol="1" spcCol="38100" rtlCol="0" anchor="ctr">
+            <a:spAutoFit/>
+          </a:bodyPr>
+          <a:lstStyle/>
+          <a:p>
+            <a:pPr marL="0" marR="0" lvl="0" indent="0" algn="ctr" defTabSz="821531" eaLnBrk="1" fontAlgn="auto" latinLnBrk="0" hangingPunct="0">
+              <a:lnSpc>
+                <a:spcPct val="100000"/>
+              </a:lnSpc>
+              <a:spcBef>
+                <a:spcPts val="0"/>
+              </a:spcBef>
+              <a:spcAft>
+                <a:spcPts val="0"/>
+              </a:spcAft>
+              <a:buClrTx/>
+              <a:buSzTx/>
+              <a:buFontTx/>
+              <a:buNone/>
+              <a:tabLst/>
+              <a:defRPr/>
+            </a:pPr>
+            <a:r>
+              <a:rPr kumimoji="0" lang="en-US" altLang="zh-TW" b="1" i="0" u="none" strike="noStrike" kern="0" cap="none" spc="0" normalizeH="0" baseline="0" noProof="0" dirty="0">
+                <a:ln>
+                  <a:noFill/>
+                </a:ln>
+                <a:solidFill>
+                  <a:srgbClr val="FF0000"/>
+                </a:solidFill>
+                <a:effectLst/>
+                <a:uLnTx/>
+                <a:uFillTx/>
+                <a:latin typeface="Helvetica Neue"/>
+                <a:sym typeface="Helvetica Light"/>
+              </a:rPr>
+              <a:t>2</a:t>
+            </a:r>
+            <a:endParaRPr kumimoji="0" lang="zh-TW" altLang="en-US" b="1" i="0" u="none" strike="noStrike" kern="0" cap="none" spc="0" normalizeH="0" baseline="0" noProof="0" dirty="0">
+              <a:ln>
+                <a:noFill/>
+              </a:ln>
+              <a:solidFill>
+                <a:srgbClr val="FF0000"/>
+              </a:solidFill>
+              <a:effectLst/>
+              <a:uLnTx/>
+              <a:uFillTx/>
+              <a:latin typeface="Helvetica Neue"/>
+              <a:sym typeface="Helvetica Light"/>
+            </a:endParaRPr>
+          </a:p>
+        </p:txBody>
+      </p:sp>
+      <p:sp>
+        <p:nvSpPr>
+          <p:cNvPr id="14" name="橢圓 13">
+            <a:extLst>
+              <a:ext uri="{FF2B5EF4-FFF2-40B4-BE49-F238E27FC236}">
+                <a16:creationId xmlns:a16="http://schemas.microsoft.com/office/drawing/2014/main" id="{9A3A8DE6-783B-3864-61F1-E01A47F3F53E}"/>
+              </a:ext>
+            </a:extLst>
+          </p:cNvPr>
+          <p:cNvSpPr/>
+          <p:nvPr/>
+        </p:nvSpPr>
+        <p:spPr>
+          <a:xfrm>
+            <a:off x="13078104" y="8161416"/>
+            <a:ext cx="576000" cy="592383"/>
+          </a:xfrm>
+          <a:prstGeom prst="ellipse">
+            <a:avLst/>
+          </a:prstGeom>
+          <a:solidFill>
+            <a:srgbClr val="000000">
+              <a:alpha val="20000"/>
+            </a:srgbClr>
+          </a:solidFill>
+          <a:ln w="12700" cap="flat">
+            <a:noFill/>
+            <a:miter lim="400000"/>
+          </a:ln>
+          <a:effectLst/>
+        </p:spPr>
+        <p:txBody>
+          <a:bodyPr rot="0" spcFirstLastPara="1" vertOverflow="overflow" horzOverflow="overflow" vert="horz" wrap="square" lIns="71437" tIns="71437" rIns="71437" bIns="71437" numCol="1" spcCol="38100" rtlCol="0" anchor="ctr">
+            <a:spAutoFit/>
+          </a:bodyPr>
+          <a:lstStyle/>
+          <a:p>
+            <a:pPr marL="0" marR="0" lvl="0" indent="0" algn="ctr" defTabSz="821531" eaLnBrk="1" fontAlgn="auto" latinLnBrk="0" hangingPunct="0">
+              <a:lnSpc>
+                <a:spcPct val="100000"/>
+              </a:lnSpc>
+              <a:spcBef>
+                <a:spcPts val="0"/>
+              </a:spcBef>
+              <a:spcAft>
+                <a:spcPts val="0"/>
+              </a:spcAft>
+              <a:buClrTx/>
+              <a:buSzTx/>
+              <a:buFontTx/>
+              <a:buNone/>
+              <a:tabLst/>
+              <a:defRPr/>
+            </a:pPr>
+            <a:r>
+              <a:rPr kumimoji="0" lang="en-US" altLang="zh-TW" b="1" i="0" u="none" strike="noStrike" kern="0" cap="none" spc="0" normalizeH="0" baseline="0" noProof="0" dirty="0">
+                <a:ln>
+                  <a:noFill/>
+                </a:ln>
+                <a:solidFill>
+                  <a:srgbClr val="FF0000"/>
+                </a:solidFill>
+                <a:effectLst/>
+                <a:uLnTx/>
+                <a:uFillTx/>
+                <a:latin typeface="Helvetica Neue"/>
+                <a:sym typeface="Helvetica Light"/>
+              </a:rPr>
+              <a:t>3</a:t>
+            </a:r>
+            <a:endParaRPr kumimoji="0" lang="zh-TW" altLang="en-US" b="1" i="0" u="none" strike="noStrike" kern="0" cap="none" spc="0" normalizeH="0" baseline="0" noProof="0" dirty="0">
+              <a:ln>
+                <a:noFill/>
+              </a:ln>
+              <a:solidFill>
+                <a:srgbClr val="FF0000"/>
+              </a:solidFill>
+              <a:effectLst/>
+              <a:uLnTx/>
+              <a:uFillTx/>
+              <a:latin typeface="Helvetica Neue"/>
+              <a:sym typeface="Helvetica Light"/>
+            </a:endParaRPr>
+          </a:p>
+        </p:txBody>
+      </p:sp>
+    </p:spTree>
+    <p:extLst>
+      <p:ext uri="{BB962C8B-B14F-4D97-AF65-F5344CB8AC3E}">
+        <p14:creationId xmlns:p14="http://schemas.microsoft.com/office/powerpoint/2010/main" val="3341528457"/>
+      </p:ext>
+    </p:extLst>
+  </p:cSld>
+  <p:clrMapOvr>
+    <a:masterClrMapping/>
+  </p:clrMapOvr>
+</p:sld>
+</file>
+
+<file path=ppt/slides/slide5.xml><?xml version="1.0" encoding="utf-8"?>
+<p:sld xmlns:a="http://schemas.openxmlformats.org/drawingml/2006/main" xmlns:r="http://schemas.openxmlformats.org/officeDocument/2006/relationships" xmlns:p="http://schemas.openxmlformats.org/presentationml/2006/main">
+  <p:cSld>
+    <p:spTree>
+      <p:nvGrpSpPr>
+        <p:cNvPr id="1" name=""/>
+        <p:cNvGrpSpPr/>
+        <p:nvPr/>
+      </p:nvGrpSpPr>
+      <p:grpSpPr>
+        <a:xfrm>
+          <a:off x="0" y="0"/>
+          <a:ext cx="0" cy="0"/>
+          <a:chOff x="0" y="0"/>
+          <a:chExt cx="0" cy="0"/>
+        </a:xfrm>
+      </p:grpSpPr>
+      <p:pic>
+        <p:nvPicPr>
+          <p:cNvPr id="16" name="圖片 15">
+            <a:extLst>
+              <a:ext uri="{FF2B5EF4-FFF2-40B4-BE49-F238E27FC236}">
+                <a16:creationId xmlns:a16="http://schemas.microsoft.com/office/drawing/2014/main" id="{951C4BAA-DF43-8D31-5559-50C5A962EE96}"/>
+              </a:ext>
+            </a:extLst>
+          </p:cNvPr>
+          <p:cNvPicPr>
+            <a:picLocks noChangeAspect="1"/>
+          </p:cNvPicPr>
+          <p:nvPr/>
+        </p:nvPicPr>
+        <p:blipFill>
+          <a:blip r:embed="rId2"/>
+          <a:stretch>
+            <a:fillRect/>
+          </a:stretch>
+        </p:blipFill>
+        <p:spPr>
+          <a:xfrm>
+            <a:off x="4876166" y="2971463"/>
+            <a:ext cx="14631668" cy="7773074"/>
+          </a:xfrm>
+          <a:prstGeom prst="rect">
+            <a:avLst/>
+          </a:prstGeom>
+        </p:spPr>
+      </p:pic>
+      <p:sp>
+        <p:nvSpPr>
+          <p:cNvPr id="4" name="矩形 3">
+            <a:extLst>
+              <a:ext uri="{FF2B5EF4-FFF2-40B4-BE49-F238E27FC236}">
+                <a16:creationId xmlns:a16="http://schemas.microsoft.com/office/drawing/2014/main" id="{555189ED-4827-91F3-A94A-677510879D90}"/>
+              </a:ext>
+            </a:extLst>
+          </p:cNvPr>
+          <p:cNvSpPr/>
+          <p:nvPr/>
+        </p:nvSpPr>
+        <p:spPr>
+          <a:xfrm>
+            <a:off x="6356643" y="4021871"/>
+            <a:ext cx="2834146" cy="413303"/>
+          </a:xfrm>
+          <a:prstGeom prst="rect">
+            <a:avLst/>
+          </a:prstGeom>
+          <a:noFill/>
+          <a:ln w="57150">
+            <a:solidFill>
+              <a:srgbClr val="FF0000"/>
+            </a:solidFill>
+          </a:ln>
+        </p:spPr>
+        <p:style>
+          <a:lnRef idx="2">
+            <a:schemeClr val="accent1">
+              <a:shade val="50000"/>
+            </a:schemeClr>
+          </a:lnRef>
+          <a:fillRef idx="1">
+            <a:schemeClr val="accent1"/>
+          </a:fillRef>
+          <a:effectRef idx="0">
+            <a:schemeClr val="accent1"/>
+          </a:effectRef>
+          <a:fontRef idx="minor">
+            <a:schemeClr val="lt1"/>
+          </a:fontRef>
+        </p:style>
+        <p:txBody>
+          <a:bodyPr rtlCol="0" anchor="ctr"/>
+          <a:lstStyle/>
+          <a:p>
+            <a:pPr algn="ctr"/>
+            <a:endParaRPr lang="zh-TW" altLang="en-US"/>
+          </a:p>
+        </p:txBody>
+      </p:sp>
+      <p:sp>
+        <p:nvSpPr>
+          <p:cNvPr id="12" name="橢圓 11">
+            <a:extLst>
+              <a:ext uri="{FF2B5EF4-FFF2-40B4-BE49-F238E27FC236}">
+                <a16:creationId xmlns:a16="http://schemas.microsoft.com/office/drawing/2014/main" id="{0B346C6C-A481-8F83-87FC-12660076CE53}"/>
+              </a:ext>
+            </a:extLst>
+          </p:cNvPr>
+          <p:cNvSpPr/>
+          <p:nvPr/>
+        </p:nvSpPr>
+        <p:spPr>
+          <a:xfrm>
+            <a:off x="8902789" y="3504051"/>
+            <a:ext cx="576000" cy="592383"/>
+          </a:xfrm>
+          <a:prstGeom prst="ellipse">
+            <a:avLst/>
+          </a:prstGeom>
+          <a:solidFill>
+            <a:schemeClr val="bg1">
+              <a:lumMod val="95000"/>
+              <a:alpha val="80000"/>
+            </a:schemeClr>
+          </a:solidFill>
+          <a:ln w="12700" cap="flat">
+            <a:noFill/>
+            <a:miter lim="400000"/>
+          </a:ln>
+          <a:effectLst/>
+        </p:spPr>
+        <p:txBody>
+          <a:bodyPr rot="0" spcFirstLastPara="1" vertOverflow="overflow" horzOverflow="overflow" vert="horz" wrap="square" lIns="71437" tIns="71437" rIns="71437" bIns="71437" numCol="1" spcCol="38100" rtlCol="0" anchor="ctr">
+            <a:spAutoFit/>
+          </a:bodyPr>
+          <a:lstStyle/>
+          <a:p>
+            <a:pPr marL="0" marR="0" lvl="0" indent="0" algn="ctr" defTabSz="821531" eaLnBrk="1" fontAlgn="auto" latinLnBrk="0" hangingPunct="0">
+              <a:lnSpc>
+                <a:spcPct val="100000"/>
+              </a:lnSpc>
+              <a:spcBef>
+                <a:spcPts val="0"/>
+              </a:spcBef>
+              <a:spcAft>
+                <a:spcPts val="0"/>
+              </a:spcAft>
+              <a:buClrTx/>
+              <a:buSzTx/>
+              <a:buFontTx/>
+              <a:buNone/>
+              <a:tabLst/>
+              <a:defRPr/>
+            </a:pPr>
+            <a:r>
+              <a:rPr kumimoji="0" lang="en-US" altLang="zh-TW" b="1" i="0" u="none" strike="noStrike" kern="0" cap="none" spc="0" normalizeH="0" baseline="0" noProof="0" dirty="0">
+                <a:ln>
+                  <a:noFill/>
+                </a:ln>
+                <a:solidFill>
+                  <a:srgbClr val="FF0000"/>
+                </a:solidFill>
+                <a:effectLst/>
+                <a:uLnTx/>
+                <a:uFillTx/>
+                <a:latin typeface="Helvetica Neue"/>
+                <a:sym typeface="Helvetica Light"/>
+              </a:rPr>
+              <a:t>4</a:t>
+            </a:r>
+            <a:endParaRPr kumimoji="0" lang="zh-TW" altLang="en-US" b="1" i="0" u="none" strike="noStrike" kern="0" cap="none" spc="0" normalizeH="0" baseline="0" noProof="0" dirty="0">
+              <a:ln>
+                <a:noFill/>
+              </a:ln>
+              <a:solidFill>
+                <a:srgbClr val="FF0000"/>
+              </a:solidFill>
+              <a:effectLst/>
+              <a:uLnTx/>
+              <a:uFillTx/>
+              <a:latin typeface="Helvetica Neue"/>
+              <a:sym typeface="Helvetica Light"/>
+            </a:endParaRPr>
+          </a:p>
+        </p:txBody>
+      </p:sp>
+      <p:pic>
+        <p:nvPicPr>
+          <p:cNvPr id="5" name="圖片 4">
+            <a:extLst>
+              <a:ext uri="{FF2B5EF4-FFF2-40B4-BE49-F238E27FC236}">
+                <a16:creationId xmlns:a16="http://schemas.microsoft.com/office/drawing/2014/main" id="{8B2A6CD3-A81A-4BC6-E2DB-5B87B54B9820}"/>
+              </a:ext>
+            </a:extLst>
+          </p:cNvPr>
+          <p:cNvPicPr>
+            <a:picLocks noChangeAspect="1"/>
+          </p:cNvPicPr>
+          <p:nvPr/>
+        </p:nvPicPr>
+        <p:blipFill>
+          <a:blip r:embed="rId3"/>
+          <a:stretch>
+            <a:fillRect/>
+          </a:stretch>
+        </p:blipFill>
+        <p:spPr>
+          <a:xfrm>
+            <a:off x="9707541" y="5230947"/>
+            <a:ext cx="7826418" cy="4206605"/>
+          </a:xfrm>
+          <a:prstGeom prst="rect">
+            <a:avLst/>
+          </a:prstGeom>
+        </p:spPr>
+      </p:pic>
+      <p:sp>
+        <p:nvSpPr>
+          <p:cNvPr id="7" name="矩形 6">
+            <a:extLst>
+              <a:ext uri="{FF2B5EF4-FFF2-40B4-BE49-F238E27FC236}">
+                <a16:creationId xmlns:a16="http://schemas.microsoft.com/office/drawing/2014/main" id="{6985E88D-F4A3-0DFB-2F63-6F31C7980A8B}"/>
+              </a:ext>
+            </a:extLst>
+          </p:cNvPr>
+          <p:cNvSpPr/>
+          <p:nvPr/>
+        </p:nvSpPr>
+        <p:spPr>
+          <a:xfrm>
+            <a:off x="15523559" y="9031330"/>
+            <a:ext cx="919304" cy="329074"/>
+          </a:xfrm>
+          <a:prstGeom prst="rect">
+            <a:avLst/>
+          </a:prstGeom>
+          <a:noFill/>
+          <a:ln w="57150">
+            <a:solidFill>
+              <a:srgbClr val="FF0000"/>
+            </a:solidFill>
+          </a:ln>
+        </p:spPr>
+        <p:style>
+          <a:lnRef idx="2">
+            <a:schemeClr val="accent1">
+              <a:shade val="50000"/>
+            </a:schemeClr>
+          </a:lnRef>
+          <a:fillRef idx="1">
+            <a:schemeClr val="accent1"/>
+          </a:fillRef>
+          <a:effectRef idx="0">
+            <a:schemeClr val="accent1"/>
+          </a:effectRef>
+          <a:fontRef idx="minor">
+            <a:schemeClr val="lt1"/>
+          </a:fontRef>
+        </p:style>
+        <p:txBody>
+          <a:bodyPr rtlCol="0" anchor="ctr"/>
+          <a:lstStyle/>
+          <a:p>
+            <a:pPr algn="ctr"/>
+            <a:endParaRPr lang="zh-TW" altLang="en-US"/>
+          </a:p>
+        </p:txBody>
+      </p:sp>
+      <p:sp>
+        <p:nvSpPr>
+          <p:cNvPr id="8" name="橢圓 7">
+            <a:extLst>
+              <a:ext uri="{FF2B5EF4-FFF2-40B4-BE49-F238E27FC236}">
+                <a16:creationId xmlns:a16="http://schemas.microsoft.com/office/drawing/2014/main" id="{D438B62B-FA71-1C64-FDBA-B417D61BFE78}"/>
+              </a:ext>
+            </a:extLst>
+          </p:cNvPr>
+          <p:cNvSpPr/>
+          <p:nvPr/>
+        </p:nvSpPr>
+        <p:spPr>
+          <a:xfrm>
+            <a:off x="15082810" y="8510404"/>
+            <a:ext cx="576000" cy="592383"/>
+          </a:xfrm>
+          <a:prstGeom prst="ellipse">
+            <a:avLst/>
+          </a:prstGeom>
+          <a:solidFill>
+            <a:schemeClr val="bg1">
+              <a:lumMod val="95000"/>
+              <a:alpha val="80000"/>
+            </a:schemeClr>
+          </a:solidFill>
+          <a:ln w="12700" cap="flat">
+            <a:noFill/>
+            <a:miter lim="400000"/>
+          </a:ln>
+          <a:effectLst/>
+        </p:spPr>
+        <p:txBody>
+          <a:bodyPr rot="0" spcFirstLastPara="1" vertOverflow="overflow" horzOverflow="overflow" vert="horz" wrap="square" lIns="71437" tIns="71437" rIns="71437" bIns="71437" numCol="1" spcCol="38100" rtlCol="0" anchor="ctr">
+            <a:spAutoFit/>
+          </a:bodyPr>
+          <a:lstStyle/>
+          <a:p>
+            <a:pPr marL="0" marR="0" lvl="0" indent="0" algn="ctr" defTabSz="821531" eaLnBrk="1" fontAlgn="auto" latinLnBrk="0" hangingPunct="0">
+              <a:lnSpc>
+                <a:spcPct val="100000"/>
+              </a:lnSpc>
+              <a:spcBef>
+                <a:spcPts val="0"/>
+              </a:spcBef>
+              <a:spcAft>
+                <a:spcPts val="0"/>
+              </a:spcAft>
+              <a:buClrTx/>
+              <a:buSzTx/>
+              <a:buFontTx/>
+              <a:buNone/>
+              <a:tabLst/>
+              <a:defRPr/>
+            </a:pPr>
+            <a:r>
+              <a:rPr kumimoji="0" lang="en-US" altLang="zh-TW" b="1" i="0" u="none" strike="noStrike" kern="0" cap="none" spc="0" normalizeH="0" baseline="0" noProof="0" dirty="0">
+                <a:ln>
+                  <a:noFill/>
+                </a:ln>
+                <a:solidFill>
+                  <a:srgbClr val="FF0000"/>
+                </a:solidFill>
+                <a:effectLst/>
+                <a:uLnTx/>
+                <a:uFillTx/>
+                <a:latin typeface="Helvetica Neue"/>
+                <a:sym typeface="Helvetica Light"/>
+              </a:rPr>
+              <a:t>5</a:t>
+            </a:r>
+            <a:endParaRPr kumimoji="0" lang="zh-TW" altLang="en-US" b="1" i="0" u="none" strike="noStrike" kern="0" cap="none" spc="0" normalizeH="0" baseline="0" noProof="0" dirty="0">
+              <a:ln>
+                <a:noFill/>
+              </a:ln>
+              <a:solidFill>
+                <a:srgbClr val="FF0000"/>
+              </a:solidFill>
+              <a:effectLst/>
+              <a:uLnTx/>
+              <a:uFillTx/>
+              <a:latin typeface="Helvetica Neue"/>
+              <a:sym typeface="Helvetica Light"/>
+            </a:endParaRPr>
+          </a:p>
+        </p:txBody>
+      </p:sp>
+    </p:spTree>
+    <p:extLst>
+      <p:ext uri="{BB962C8B-B14F-4D97-AF65-F5344CB8AC3E}">
+        <p14:creationId xmlns:p14="http://schemas.microsoft.com/office/powerpoint/2010/main" val="164744710"/>
+      </p:ext>
+    </p:extLst>
+  </p:cSld>
+  <p:clrMapOvr>
+    <a:masterClrMapping/>
+  </p:clrMapOvr>
+</p:sld>
+</file>
+
+<file path=ppt/slides/slide6.xml><?xml version="1.0" encoding="utf-8"?>
+<p:sld xmlns:a="http://schemas.openxmlformats.org/drawingml/2006/main" xmlns:r="http://schemas.openxmlformats.org/officeDocument/2006/relationships" xmlns:p="http://schemas.openxmlformats.org/presentationml/2006/main">
+  <p:cSld>
+    <p:spTree>
+      <p:nvGrpSpPr>
+        <p:cNvPr id="1" name=""/>
+        <p:cNvGrpSpPr/>
+        <p:nvPr/>
+      </p:nvGrpSpPr>
+      <p:grpSpPr>
+        <a:xfrm>
+          <a:off x="0" y="0"/>
+          <a:ext cx="0" cy="0"/>
+          <a:chOff x="0" y="0"/>
+          <a:chExt cx="0" cy="0"/>
+        </a:xfrm>
+      </p:grpSpPr>
+      <p:pic>
+        <p:nvPicPr>
+          <p:cNvPr id="3" name="圖片 2">
+            <a:extLst>
+              <a:ext uri="{FF2B5EF4-FFF2-40B4-BE49-F238E27FC236}">
+                <a16:creationId xmlns:a16="http://schemas.microsoft.com/office/drawing/2014/main" id="{D3510D9B-CA8F-0737-CEC9-E6E1F3C24064}"/>
+              </a:ext>
+            </a:extLst>
+          </p:cNvPr>
+          <p:cNvPicPr>
+            <a:picLocks noChangeAspect="1"/>
+          </p:cNvPicPr>
+          <p:nvPr/>
+        </p:nvPicPr>
+        <p:blipFill>
+          <a:blip r:embed="rId2"/>
+          <a:stretch>
+            <a:fillRect/>
+          </a:stretch>
+        </p:blipFill>
+        <p:spPr>
+          <a:xfrm>
+            <a:off x="4876166" y="2971463"/>
+            <a:ext cx="14631668" cy="7773074"/>
+          </a:xfrm>
+          <a:prstGeom prst="rect">
+            <a:avLst/>
+          </a:prstGeom>
+        </p:spPr>
+      </p:pic>
+      <p:sp>
+        <p:nvSpPr>
+          <p:cNvPr id="6" name="矩形 5">
+            <a:extLst>
+              <a:ext uri="{FF2B5EF4-FFF2-40B4-BE49-F238E27FC236}">
+                <a16:creationId xmlns:a16="http://schemas.microsoft.com/office/drawing/2014/main" id="{687FDAB4-5A0E-4B64-FFB6-DCD8054AE47A}"/>
+              </a:ext>
+            </a:extLst>
+          </p:cNvPr>
+          <p:cNvSpPr/>
+          <p:nvPr/>
+        </p:nvSpPr>
+        <p:spPr>
+          <a:xfrm>
+            <a:off x="12019280" y="5323840"/>
+            <a:ext cx="2621280" cy="248920"/>
+          </a:xfrm>
+          <a:prstGeom prst="rect">
+            <a:avLst/>
+          </a:prstGeom>
+          <a:noFill/>
+          <a:ln w="57150">
+            <a:solidFill>
+              <a:srgbClr val="FF0000"/>
+            </a:solidFill>
+          </a:ln>
+        </p:spPr>
+        <p:style>
+          <a:lnRef idx="2">
+            <a:schemeClr val="accent1">
+              <a:shade val="50000"/>
+            </a:schemeClr>
+          </a:lnRef>
+          <a:fillRef idx="1">
+            <a:schemeClr val="accent1"/>
+          </a:fillRef>
+          <a:effectRef idx="0">
+            <a:schemeClr val="accent1"/>
+          </a:effectRef>
+          <a:fontRef idx="minor">
+            <a:schemeClr val="lt1"/>
+          </a:fontRef>
+        </p:style>
+        <p:txBody>
+          <a:bodyPr rtlCol="0" anchor="ctr"/>
+          <a:lstStyle/>
+          <a:p>
+            <a:pPr algn="ctr"/>
+            <a:endParaRPr lang="zh-TW" altLang="en-US"/>
+          </a:p>
+        </p:txBody>
+      </p:sp>
+      <p:sp>
+        <p:nvSpPr>
+          <p:cNvPr id="7" name="橢圓 6">
+            <a:extLst>
+              <a:ext uri="{FF2B5EF4-FFF2-40B4-BE49-F238E27FC236}">
+                <a16:creationId xmlns:a16="http://schemas.microsoft.com/office/drawing/2014/main" id="{A1933D36-DA26-038D-41AD-20BA325A22B0}"/>
+              </a:ext>
+            </a:extLst>
+          </p:cNvPr>
+          <p:cNvSpPr/>
+          <p:nvPr/>
+        </p:nvSpPr>
+        <p:spPr>
+          <a:xfrm>
+            <a:off x="14439989" y="4899091"/>
+            <a:ext cx="576000" cy="592383"/>
+          </a:xfrm>
+          <a:prstGeom prst="ellipse">
+            <a:avLst/>
+          </a:prstGeom>
+          <a:solidFill>
+            <a:schemeClr val="bg1">
+              <a:lumMod val="95000"/>
+              <a:alpha val="80000"/>
+            </a:schemeClr>
+          </a:solidFill>
+          <a:ln w="12700" cap="flat">
+            <a:noFill/>
+            <a:miter lim="400000"/>
+          </a:ln>
+          <a:effectLst/>
+        </p:spPr>
+        <p:txBody>
+          <a:bodyPr rot="0" spcFirstLastPara="1" vertOverflow="overflow" horzOverflow="overflow" vert="horz" wrap="square" lIns="71437" tIns="71437" rIns="71437" bIns="71437" numCol="1" spcCol="38100" rtlCol="0" anchor="ctr">
+            <a:spAutoFit/>
+          </a:bodyPr>
+          <a:lstStyle/>
+          <a:p>
+            <a:pPr marL="0" marR="0" lvl="0" indent="0" algn="ctr" defTabSz="821531" eaLnBrk="1" fontAlgn="auto" latinLnBrk="0" hangingPunct="0">
+              <a:lnSpc>
+                <a:spcPct val="100000"/>
+              </a:lnSpc>
+              <a:spcBef>
+                <a:spcPts val="0"/>
+              </a:spcBef>
+              <a:spcAft>
+                <a:spcPts val="0"/>
+              </a:spcAft>
+              <a:buClrTx/>
+              <a:buSzTx/>
+              <a:buFontTx/>
+              <a:buNone/>
+              <a:tabLst/>
+              <a:defRPr/>
+            </a:pPr>
+            <a:r>
+              <a:rPr kumimoji="0" lang="en-US" altLang="zh-TW" b="1" i="0" u="none" strike="noStrike" kern="0" cap="none" spc="0" normalizeH="0" baseline="0" noProof="0" dirty="0">
+                <a:ln>
+                  <a:noFill/>
+                </a:ln>
+                <a:solidFill>
+                  <a:srgbClr val="FF0000"/>
+                </a:solidFill>
+                <a:effectLst/>
+                <a:uLnTx/>
+                <a:uFillTx/>
+                <a:latin typeface="Helvetica Neue"/>
+                <a:sym typeface="Helvetica Light"/>
+              </a:rPr>
+              <a:t>6</a:t>
+            </a:r>
+            <a:endParaRPr kumimoji="0" lang="zh-TW" altLang="en-US" b="1" i="0" u="none" strike="noStrike" kern="0" cap="none" spc="0" normalizeH="0" baseline="0" noProof="0" dirty="0">
+              <a:ln>
+                <a:noFill/>
+              </a:ln>
+              <a:solidFill>
+                <a:srgbClr val="FF0000"/>
+              </a:solidFill>
+              <a:effectLst/>
+              <a:uLnTx/>
+              <a:uFillTx/>
+              <a:latin typeface="Helvetica Neue"/>
+              <a:sym typeface="Helvetica Light"/>
+            </a:endParaRPr>
+          </a:p>
+        </p:txBody>
+      </p:sp>
+      <p:sp>
+        <p:nvSpPr>
+          <p:cNvPr id="8" name="矩形 7">
+            <a:extLst>
+              <a:ext uri="{FF2B5EF4-FFF2-40B4-BE49-F238E27FC236}">
+                <a16:creationId xmlns:a16="http://schemas.microsoft.com/office/drawing/2014/main" id="{E499D310-5AE3-2140-58A7-189626C5099C}"/>
+              </a:ext>
+            </a:extLst>
+          </p:cNvPr>
+          <p:cNvSpPr/>
+          <p:nvPr/>
+        </p:nvSpPr>
+        <p:spPr>
+          <a:xfrm>
+            <a:off x="13215620" y="8315960"/>
+            <a:ext cx="767080" cy="286044"/>
+          </a:xfrm>
+          <a:prstGeom prst="rect">
+            <a:avLst/>
+          </a:prstGeom>
+          <a:noFill/>
+          <a:ln w="57150">
+            <a:solidFill>
+              <a:srgbClr val="FF0000"/>
+            </a:solidFill>
+          </a:ln>
+        </p:spPr>
+        <p:style>
+          <a:lnRef idx="2">
+            <a:schemeClr val="accent1">
+              <a:shade val="50000"/>
+            </a:schemeClr>
+          </a:lnRef>
+          <a:fillRef idx="1">
+            <a:schemeClr val="accent1"/>
+          </a:fillRef>
+          <a:effectRef idx="0">
+            <a:schemeClr val="accent1"/>
+          </a:effectRef>
+          <a:fontRef idx="minor">
+            <a:schemeClr val="lt1"/>
+          </a:fontRef>
+        </p:style>
+        <p:txBody>
+          <a:bodyPr rtlCol="0" anchor="ctr"/>
+          <a:lstStyle/>
+          <a:p>
+            <a:pPr algn="ctr"/>
+            <a:endParaRPr lang="zh-TW" altLang="en-US"/>
+          </a:p>
+        </p:txBody>
+      </p:sp>
+      <p:sp>
+        <p:nvSpPr>
+          <p:cNvPr id="9" name="橢圓 8">
+            <a:extLst>
+              <a:ext uri="{FF2B5EF4-FFF2-40B4-BE49-F238E27FC236}">
+                <a16:creationId xmlns:a16="http://schemas.microsoft.com/office/drawing/2014/main" id="{672A6A48-B28D-A6CD-C3F1-773C8B61300A}"/>
+              </a:ext>
+            </a:extLst>
+          </p:cNvPr>
+          <p:cNvSpPr/>
+          <p:nvPr/>
+        </p:nvSpPr>
+        <p:spPr>
+          <a:xfrm>
+            <a:off x="13764349" y="7885155"/>
+            <a:ext cx="576000" cy="592383"/>
+          </a:xfrm>
+          <a:prstGeom prst="ellipse">
+            <a:avLst/>
+          </a:prstGeom>
+          <a:solidFill>
+            <a:schemeClr val="bg1">
+              <a:lumMod val="95000"/>
+              <a:alpha val="80000"/>
+            </a:schemeClr>
+          </a:solidFill>
+          <a:ln w="12700" cap="flat">
+            <a:noFill/>
+            <a:miter lim="400000"/>
+          </a:ln>
+          <a:effectLst/>
+        </p:spPr>
+        <p:txBody>
+          <a:bodyPr rot="0" spcFirstLastPara="1" vertOverflow="overflow" horzOverflow="overflow" vert="horz" wrap="square" lIns="71437" tIns="71437" rIns="71437" bIns="71437" numCol="1" spcCol="38100" rtlCol="0" anchor="ctr">
+            <a:spAutoFit/>
+          </a:bodyPr>
+          <a:lstStyle/>
+          <a:p>
+            <a:pPr marL="0" marR="0" lvl="0" indent="0" algn="ctr" defTabSz="821531" eaLnBrk="1" fontAlgn="auto" latinLnBrk="0" hangingPunct="0">
+              <a:lnSpc>
+                <a:spcPct val="100000"/>
+              </a:lnSpc>
+              <a:spcBef>
+                <a:spcPts val="0"/>
+              </a:spcBef>
+              <a:spcAft>
+                <a:spcPts val="0"/>
+              </a:spcAft>
+              <a:buClrTx/>
+              <a:buSzTx/>
+              <a:buFontTx/>
+              <a:buNone/>
+              <a:tabLst/>
+              <a:defRPr/>
+            </a:pPr>
+            <a:r>
+              <a:rPr kumimoji="0" lang="en-US" altLang="zh-TW" b="1" i="0" u="none" strike="noStrike" kern="0" cap="none" spc="0" normalizeH="0" baseline="0" noProof="0" dirty="0">
+                <a:ln>
+                  <a:noFill/>
+                </a:ln>
+                <a:solidFill>
+                  <a:srgbClr val="FF0000"/>
+                </a:solidFill>
+                <a:effectLst/>
+                <a:uLnTx/>
+                <a:uFillTx/>
+                <a:latin typeface="Helvetica Neue"/>
+                <a:sym typeface="Helvetica Light"/>
+              </a:rPr>
+              <a:t>7</a:t>
+            </a:r>
+            <a:endParaRPr kumimoji="0" lang="zh-TW" altLang="en-US" b="1" i="0" u="none" strike="noStrike" kern="0" cap="none" spc="0" normalizeH="0" baseline="0" noProof="0" dirty="0">
+              <a:ln>
+                <a:noFill/>
+              </a:ln>
+              <a:solidFill>
+                <a:srgbClr val="FF0000"/>
+              </a:solidFill>
+              <a:effectLst/>
+              <a:uLnTx/>
+              <a:uFillTx/>
+              <a:latin typeface="Helvetica Neue"/>
+              <a:sym typeface="Helvetica Light"/>
+            </a:endParaRPr>
+          </a:p>
+        </p:txBody>
+      </p:sp>
+    </p:spTree>
+    <p:extLst>
+      <p:ext uri="{BB962C8B-B14F-4D97-AF65-F5344CB8AC3E}">
+        <p14:creationId xmlns:p14="http://schemas.microsoft.com/office/powerpoint/2010/main" val="2850962794"/>
+      </p:ext>
+    </p:extLst>
+  </p:cSld>
+  <p:clrMapOvr>
+    <a:masterClrMapping/>
+  </p:clrMapOvr>
+</p:sld>
+</file>
+
 <file path=ppt/theme/theme1.xml><?xml version="1.0" encoding="utf-8"?>
 <a:theme xmlns:a="http://schemas.openxmlformats.org/drawingml/2006/main" name="Office 佈景主題">
   <a:themeElements>

</xml_diff>